<commit_message>
text font changes and PP update
</commit_message>
<xml_diff>
--- a/assets/Skulduggery.pptx
+++ b/assets/Skulduggery.pptx
@@ -1626,7 +1626,7 @@
             <a:fld id="{5923F103-BC34-4FE4-A40E-EDDEECFDA5D0}" type="datetimeFigureOut">
               <a:rPr lang="en-US" dirty="0"/>
               <a:pPr/>
-              <a:t>5/27/2021</a:t>
+              <a:t>5/29/2021</a:t>
             </a:fld>
             <a:endParaRPr lang="en-US" dirty="0"/>
           </a:p>
@@ -2728,7 +2728,7 @@
           <a:p>
             <a:fld id="{923A1CC3-2375-41D4-9E03-427CAF2A4C1A}" type="datetimeFigureOut">
               <a:rPr lang="en-US" dirty="0"/>
-              <a:t>5/27/2021</a:t>
+              <a:t>5/29/2021</a:t>
             </a:fld>
             <a:endParaRPr lang="en-US" dirty="0"/>
           </a:p>
@@ -3722,7 +3722,7 @@
           <a:p>
             <a:fld id="{AFF16868-8199-4C2C-A5B1-63AEE139F88E}" type="datetimeFigureOut">
               <a:rPr lang="en-US" dirty="0"/>
-              <a:t>5/27/2021</a:t>
+              <a:t>5/29/2021</a:t>
             </a:fld>
             <a:endParaRPr lang="en-US" dirty="0"/>
           </a:p>
@@ -4870,7 +4870,7 @@
           <a:p>
             <a:fld id="{AAD9FF7F-6988-44CC-821B-644E70CD2F73}" type="datetimeFigureOut">
               <a:rPr lang="en-US" dirty="0"/>
-              <a:t>5/27/2021</a:t>
+              <a:t>5/29/2021</a:t>
             </a:fld>
             <a:endParaRPr lang="en-US" dirty="0"/>
           </a:p>
@@ -5917,7 +5917,7 @@
           <a:p>
             <a:fld id="{5C12C299-16B2-4475-990D-751901EACC14}" type="datetimeFigureOut">
               <a:rPr lang="en-US" dirty="0"/>
-              <a:t>5/27/2021</a:t>
+              <a:t>5/29/2021</a:t>
             </a:fld>
             <a:endParaRPr lang="en-US" dirty="0"/>
           </a:p>
@@ -6591,7 +6591,7 @@
           <a:p>
             <a:fld id="{9FE86839-B9D8-4651-8783-F325ECE74E65}" type="datetimeFigureOut">
               <a:rPr lang="en-US" dirty="0"/>
-              <a:t>5/27/2021</a:t>
+              <a:t>5/29/2021</a:t>
             </a:fld>
             <a:endParaRPr lang="en-US" dirty="0"/>
           </a:p>
@@ -7466,7 +7466,7 @@
           <a:p>
             <a:fld id="{FD484F64-32F6-45C5-931F-ADC1662401D0}" type="datetimeFigureOut">
               <a:rPr lang="en-US" dirty="0"/>
-              <a:t>5/27/2021</a:t>
+              <a:t>5/29/2021</a:t>
             </a:fld>
             <a:endParaRPr lang="en-US" dirty="0"/>
           </a:p>
@@ -7670,7 +7670,7 @@
           <a:p>
             <a:fld id="{53086D93-FCAC-47E0-A2EE-787E62CA814C}" type="datetimeFigureOut">
               <a:rPr lang="en-US" dirty="0"/>
-              <a:t>5/27/2021</a:t>
+              <a:t>5/29/2021</a:t>
             </a:fld>
             <a:endParaRPr lang="en-US" dirty="0"/>
           </a:p>
@@ -8656,7 +8656,7 @@
           <a:p>
             <a:fld id="{CDA879A6-0FD0-4734-A311-86BFCA472E6E}" type="datetimeFigureOut">
               <a:rPr lang="en-US" dirty="0"/>
-              <a:t>5/27/2021</a:t>
+              <a:t>5/29/2021</a:t>
             </a:fld>
             <a:endParaRPr lang="en-US" dirty="0"/>
           </a:p>
@@ -9486,7 +9486,7 @@
           <a:p>
             <a:fld id="{19C9CA7B-DFD4-44B5-8C60-D14B8CD1FB59}" type="datetimeFigureOut">
               <a:rPr lang="en-US" dirty="0"/>
-              <a:t>5/27/2021</a:t>
+              <a:t>5/29/2021</a:t>
             </a:fld>
             <a:endParaRPr lang="en-US" dirty="0"/>
           </a:p>
@@ -10534,7 +10534,7 @@
           <a:p>
             <a:fld id="{F34E6425-0181-43F2-84FC-787E803FD2F8}" type="datetimeFigureOut">
               <a:rPr lang="en-US" dirty="0"/>
-              <a:t>5/27/2021</a:t>
+              <a:t>5/29/2021</a:t>
             </a:fld>
             <a:endParaRPr lang="en-US" dirty="0"/>
           </a:p>
@@ -10820,7 +10820,7 @@
           <a:p>
             <a:fld id="{3BDB8791-F1B0-41E7-B7FD-A781E65C4266}" type="datetimeFigureOut">
               <a:rPr lang="en-US" dirty="0"/>
-              <a:t>5/27/2021</a:t>
+              <a:t>5/29/2021</a:t>
             </a:fld>
             <a:endParaRPr lang="en-US" dirty="0"/>
           </a:p>
@@ -11244,7 +11244,7 @@
           <a:p>
             <a:fld id="{5FDD63B2-E120-4ED8-B27B-C685F510A5FE}" type="datetimeFigureOut">
               <a:rPr lang="en-US" dirty="0"/>
-              <a:t>5/27/2021</a:t>
+              <a:t>5/29/2021</a:t>
             </a:fld>
             <a:endParaRPr lang="en-US" dirty="0"/>
           </a:p>
@@ -11385,7 +11385,7 @@
           <a:p>
             <a:fld id="{7AA18ACC-A947-437B-A130-35BD54FDF1E9}" type="datetimeFigureOut">
               <a:rPr lang="en-US" dirty="0"/>
-              <a:t>5/27/2021</a:t>
+              <a:t>5/29/2021</a:t>
             </a:fld>
             <a:endParaRPr lang="en-US" dirty="0"/>
           </a:p>
@@ -11494,7 +11494,7 @@
           <a:p>
             <a:fld id="{7C8D7E02-BCB8-4D50-A234-369438C08659}" type="datetimeFigureOut">
               <a:rPr lang="en-US" dirty="0"/>
-              <a:t>5/27/2021</a:t>
+              <a:t>5/29/2021</a:t>
             </a:fld>
             <a:endParaRPr lang="en-US" dirty="0"/>
           </a:p>
@@ -12588,7 +12588,7 @@
           <a:p>
             <a:fld id="{76E86A4C-8E40-4F87-A4F0-01A0687C5742}" type="datetimeFigureOut">
               <a:rPr lang="en-US" dirty="0"/>
-              <a:t>5/27/2021</a:t>
+              <a:t>5/29/2021</a:t>
             </a:fld>
             <a:endParaRPr lang="en-US" dirty="0"/>
           </a:p>
@@ -13710,7 +13710,7 @@
           <a:p>
             <a:fld id="{35E72C73-2D91-4E12-BA25-F0AA0C03599B}" type="datetimeFigureOut">
               <a:rPr lang="en-US" dirty="0"/>
-              <a:t>5/27/2021</a:t>
+              <a:t>5/29/2021</a:t>
             </a:fld>
             <a:endParaRPr lang="en-US" dirty="0"/>
           </a:p>
@@ -14721,7 +14721,7 @@
           <a:p>
             <a:fld id="{2BE451C3-0FF4-47C4-B829-773ADF60F88C}" type="datetimeFigureOut">
               <a:rPr lang="en-US" dirty="0"/>
-              <a:t>5/27/2021</a:t>
+              <a:t>5/29/2021</a:t>
             </a:fld>
             <a:endParaRPr lang="en-US" dirty="0"/>
           </a:p>
@@ -16617,7 +16617,7 @@
             </a:pPr>
             <a:r>
               <a:rPr lang="en-US" dirty="0"/>
-              <a:t>Ethan --- randomized background &amp; drop-down menus, also floated other projects</a:t>
+              <a:t>Ethan --- randomized background &amp; drop-down menus, floated around</a:t>
             </a:r>
           </a:p>
           <a:p>
@@ -16667,24 +16667,26 @@
             </a:pPr>
             <a:r>
               <a:rPr lang="en-US" dirty="0"/>
-              <a:t>Mohamed --- fixed issues, bugs, and floated </a:t>
+              <a:t>Mohamed --- fixed issues</a:t>
             </a:r>
           </a:p>
           <a:p>
-            <a:pPr marL="114300" lvl="0" indent="0" algn="l" rtl="0">
+            <a:pPr lvl="1">
               <a:spcBef>
                 <a:spcPts val="0"/>
               </a:spcBef>
-              <a:spcAft>
-                <a:spcPts val="0"/>
-              </a:spcAft>
               <a:buSzPts val="1800"/>
-              <a:buNone/>
+              <a:buFont typeface="Wingdings" panose="05000000000000000000" pitchFamily="2" charset="2"/>
+              <a:buChar char="§"/>
             </a:pPr>
             <a:endParaRPr lang="en-US" dirty="0"/>
           </a:p>
           <a:p>
-            <a:pPr>
+            <a:pPr lvl="1">
+              <a:spcBef>
+                <a:spcPts val="0"/>
+              </a:spcBef>
+              <a:buSzPts val="1800"/>
               <a:buFont typeface="Wingdings" panose="05000000000000000000" pitchFamily="2" charset="2"/>
               <a:buChar char="v"/>
             </a:pPr>

</xml_diff>